<commit_message>
*New Ideal MHD presentations
</commit_message>
<xml_diff>
--- a/Presentations/IdealMHD_ch6.pptx
+++ b/Presentations/IdealMHD_ch6.pptx
@@ -12,6 +12,17 @@
     <p:sldId id="261" r:id="rId6"/>
     <p:sldId id="262" r:id="rId7"/>
     <p:sldId id="263" r:id="rId8"/>
+    <p:sldId id="264" r:id="rId9"/>
+    <p:sldId id="265" r:id="rId10"/>
+    <p:sldId id="266" r:id="rId11"/>
+    <p:sldId id="267" r:id="rId12"/>
+    <p:sldId id="268" r:id="rId13"/>
+    <p:sldId id="269" r:id="rId14"/>
+    <p:sldId id="270" r:id="rId15"/>
+    <p:sldId id="271" r:id="rId16"/>
+    <p:sldId id="272" r:id="rId17"/>
+    <p:sldId id="273" r:id="rId18"/>
+    <p:sldId id="274" r:id="rId19"/>
   </p:sldIdLst>
   <p:sldSz cx="12192000" cy="6858000"/>
   <p:notesSz cx="6858000" cy="9144000"/>
@@ -265,7 +276,7 @@
           <a:p>
             <a:fld id="{E0585733-0B8F-AE44-850E-C11BBC73B782}" type="datetimeFigureOut">
               <a:rPr lang="en-US" smtClean="0"/>
-              <a:t>1/24/21</a:t>
+              <a:t>2/7/21</a:t>
             </a:fld>
             <a:endParaRPr lang="en-US"/>
           </a:p>
@@ -463,7 +474,7 @@
           <a:p>
             <a:fld id="{E0585733-0B8F-AE44-850E-C11BBC73B782}" type="datetimeFigureOut">
               <a:rPr lang="en-US" smtClean="0"/>
-              <a:t>1/24/21</a:t>
+              <a:t>2/7/21</a:t>
             </a:fld>
             <a:endParaRPr lang="en-US"/>
           </a:p>
@@ -671,7 +682,7 @@
           <a:p>
             <a:fld id="{E0585733-0B8F-AE44-850E-C11BBC73B782}" type="datetimeFigureOut">
               <a:rPr lang="en-US" smtClean="0"/>
-              <a:t>1/24/21</a:t>
+              <a:t>2/7/21</a:t>
             </a:fld>
             <a:endParaRPr lang="en-US"/>
           </a:p>
@@ -869,7 +880,7 @@
           <a:p>
             <a:fld id="{E0585733-0B8F-AE44-850E-C11BBC73B782}" type="datetimeFigureOut">
               <a:rPr lang="en-US" smtClean="0"/>
-              <a:t>1/24/21</a:t>
+              <a:t>2/7/21</a:t>
             </a:fld>
             <a:endParaRPr lang="en-US"/>
           </a:p>
@@ -1144,7 +1155,7 @@
           <a:p>
             <a:fld id="{E0585733-0B8F-AE44-850E-C11BBC73B782}" type="datetimeFigureOut">
               <a:rPr lang="en-US" smtClean="0"/>
-              <a:t>1/24/21</a:t>
+              <a:t>2/7/21</a:t>
             </a:fld>
             <a:endParaRPr lang="en-US"/>
           </a:p>
@@ -1409,7 +1420,7 @@
           <a:p>
             <a:fld id="{E0585733-0B8F-AE44-850E-C11BBC73B782}" type="datetimeFigureOut">
               <a:rPr lang="en-US" smtClean="0"/>
-              <a:t>1/24/21</a:t>
+              <a:t>2/7/21</a:t>
             </a:fld>
             <a:endParaRPr lang="en-US"/>
           </a:p>
@@ -1821,7 +1832,7 @@
           <a:p>
             <a:fld id="{E0585733-0B8F-AE44-850E-C11BBC73B782}" type="datetimeFigureOut">
               <a:rPr lang="en-US" smtClean="0"/>
-              <a:t>1/24/21</a:t>
+              <a:t>2/7/21</a:t>
             </a:fld>
             <a:endParaRPr lang="en-US"/>
           </a:p>
@@ -1962,7 +1973,7 @@
           <a:p>
             <a:fld id="{E0585733-0B8F-AE44-850E-C11BBC73B782}" type="datetimeFigureOut">
               <a:rPr lang="en-US" smtClean="0"/>
-              <a:t>1/24/21</a:t>
+              <a:t>2/7/21</a:t>
             </a:fld>
             <a:endParaRPr lang="en-US"/>
           </a:p>
@@ -2075,7 +2086,7 @@
           <a:p>
             <a:fld id="{E0585733-0B8F-AE44-850E-C11BBC73B782}" type="datetimeFigureOut">
               <a:rPr lang="en-US" smtClean="0"/>
-              <a:t>1/24/21</a:t>
+              <a:t>2/7/21</a:t>
             </a:fld>
             <a:endParaRPr lang="en-US"/>
           </a:p>
@@ -2386,7 +2397,7 @@
           <a:p>
             <a:fld id="{E0585733-0B8F-AE44-850E-C11BBC73B782}" type="datetimeFigureOut">
               <a:rPr lang="en-US" smtClean="0"/>
-              <a:t>1/24/21</a:t>
+              <a:t>2/7/21</a:t>
             </a:fld>
             <a:endParaRPr lang="en-US"/>
           </a:p>
@@ -2674,7 +2685,7 @@
           <a:p>
             <a:fld id="{E0585733-0B8F-AE44-850E-C11BBC73B782}" type="datetimeFigureOut">
               <a:rPr lang="en-US" smtClean="0"/>
-              <a:t>1/24/21</a:t>
+              <a:t>2/7/21</a:t>
             </a:fld>
             <a:endParaRPr lang="en-US"/>
           </a:p>
@@ -2915,7 +2926,7 @@
           <a:p>
             <a:fld id="{E0585733-0B8F-AE44-850E-C11BBC73B782}" type="datetimeFigureOut">
               <a:rPr lang="en-US" smtClean="0"/>
-              <a:t>1/24/21</a:t>
+              <a:t>2/7/21</a:t>
             </a:fld>
             <a:endParaRPr lang="en-US"/>
           </a:p>
@@ -3401,6 +3412,1310 @@
 </p:sld>
 </file>
 
+<file path=ppt/slides/slide10.xml><?xml version="1.0" encoding="utf-8"?>
+<p:sld xmlns:a="http://schemas.openxmlformats.org/drawingml/2006/main" xmlns:r="http://schemas.openxmlformats.org/officeDocument/2006/relationships" xmlns:p="http://schemas.openxmlformats.org/presentationml/2006/main">
+  <p:cSld>
+    <p:spTree>
+      <p:nvGrpSpPr>
+        <p:cNvPr id="1" name=""/>
+        <p:cNvGrpSpPr/>
+        <p:nvPr/>
+      </p:nvGrpSpPr>
+      <p:grpSpPr>
+        <a:xfrm>
+          <a:off x="0" y="0"/>
+          <a:ext cx="0" cy="0"/>
+          <a:chOff x="0" y="0"/>
+          <a:chExt cx="0" cy="0"/>
+        </a:xfrm>
+      </p:grpSpPr>
+      <p:sp>
+        <p:nvSpPr>
+          <p:cNvPr id="2" name="Title 1">
+            <a:extLst>
+              <a:ext uri="{FF2B5EF4-FFF2-40B4-BE49-F238E27FC236}">
+                <a16:creationId xmlns:a16="http://schemas.microsoft.com/office/drawing/2014/main" id="{97B1DF26-5F7F-DD43-A17D-D5D661ECD0FC}"/>
+              </a:ext>
+            </a:extLst>
+          </p:cNvPr>
+          <p:cNvSpPr>
+            <a:spLocks noGrp="1"/>
+          </p:cNvSpPr>
+          <p:nvPr>
+            <p:ph type="title"/>
+          </p:nvPr>
+        </p:nvSpPr>
+        <p:spPr/>
+        <p:txBody>
+          <a:bodyPr/>
+          <a:lstStyle/>
+          <a:p>
+            <a:r>
+              <a:rPr lang="en-US" dirty="0"/>
+              <a:t>6.6.2 Examples: TFTR and JET</a:t>
+            </a:r>
+          </a:p>
+        </p:txBody>
+      </p:sp>
+      <p:sp>
+        <p:nvSpPr>
+          <p:cNvPr id="3" name="Content Placeholder 2">
+            <a:extLst>
+              <a:ext uri="{FF2B5EF4-FFF2-40B4-BE49-F238E27FC236}">
+                <a16:creationId xmlns:a16="http://schemas.microsoft.com/office/drawing/2014/main" id="{A817560D-2863-0E47-932C-8FF8C708226C}"/>
+              </a:ext>
+            </a:extLst>
+          </p:cNvPr>
+          <p:cNvSpPr>
+            <a:spLocks noGrp="1"/>
+          </p:cNvSpPr>
+          <p:nvPr>
+            <p:ph idx="1"/>
+          </p:nvPr>
+        </p:nvSpPr>
+        <p:spPr/>
+        <p:txBody>
+          <a:bodyPr/>
+          <a:lstStyle/>
+          <a:p>
+            <a:r>
+              <a:rPr lang="en-US" dirty="0"/>
+              <a:t>The shifted magnetic axis location is achieved</a:t>
+            </a:r>
+          </a:p>
+        </p:txBody>
+      </p:sp>
+    </p:spTree>
+    <p:extLst>
+      <p:ext uri="{BB962C8B-B14F-4D97-AF65-F5344CB8AC3E}">
+        <p14:creationId xmlns:p14="http://schemas.microsoft.com/office/powerpoint/2010/main" val="3656769033"/>
+      </p:ext>
+    </p:extLst>
+  </p:cSld>
+  <p:clrMapOvr>
+    <a:masterClrMapping/>
+  </p:clrMapOvr>
+</p:sld>
+</file>
+
+<file path=ppt/slides/slide11.xml><?xml version="1.0" encoding="utf-8"?>
+<p:sld xmlns:a="http://schemas.openxmlformats.org/drawingml/2006/main" xmlns:r="http://schemas.openxmlformats.org/officeDocument/2006/relationships" xmlns:p="http://schemas.openxmlformats.org/presentationml/2006/main">
+  <p:cSld>
+    <p:spTree>
+      <p:nvGrpSpPr>
+        <p:cNvPr id="1" name=""/>
+        <p:cNvGrpSpPr/>
+        <p:nvPr/>
+      </p:nvGrpSpPr>
+      <p:grpSpPr>
+        <a:xfrm>
+          <a:off x="0" y="0"/>
+          <a:ext cx="0" cy="0"/>
+          <a:chOff x="0" y="0"/>
+          <a:chExt cx="0" cy="0"/>
+        </a:xfrm>
+      </p:grpSpPr>
+      <p:sp>
+        <p:nvSpPr>
+          <p:cNvPr id="2" name="Title 1">
+            <a:extLst>
+              <a:ext uri="{FF2B5EF4-FFF2-40B4-BE49-F238E27FC236}">
+                <a16:creationId xmlns:a16="http://schemas.microsoft.com/office/drawing/2014/main" id="{E6144113-BB91-BD46-AF09-32DFC6C6B6DA}"/>
+              </a:ext>
+            </a:extLst>
+          </p:cNvPr>
+          <p:cNvSpPr>
+            <a:spLocks noGrp="1"/>
+          </p:cNvSpPr>
+          <p:nvPr>
+            <p:ph type="title"/>
+          </p:nvPr>
+        </p:nvSpPr>
+        <p:spPr/>
+        <p:txBody>
+          <a:bodyPr/>
+          <a:lstStyle/>
+          <a:p>
+            <a:r>
+              <a:rPr lang="en-US" dirty="0"/>
+              <a:t>6.6.3 Example: The Spherical Tokamak (ST)</a:t>
+            </a:r>
+          </a:p>
+        </p:txBody>
+      </p:sp>
+      <p:sp>
+        <p:nvSpPr>
+          <p:cNvPr id="3" name="Content Placeholder 2">
+            <a:extLst>
+              <a:ext uri="{FF2B5EF4-FFF2-40B4-BE49-F238E27FC236}">
+                <a16:creationId xmlns:a16="http://schemas.microsoft.com/office/drawing/2014/main" id="{92CFC323-87CA-954B-951E-CF9650500C5E}"/>
+              </a:ext>
+            </a:extLst>
+          </p:cNvPr>
+          <p:cNvSpPr>
+            <a:spLocks noGrp="1"/>
+          </p:cNvSpPr>
+          <p:nvPr>
+            <p:ph idx="1"/>
+          </p:nvPr>
+        </p:nvSpPr>
+        <p:spPr/>
+        <p:txBody>
+          <a:bodyPr/>
+          <a:lstStyle/>
+          <a:p>
+            <a:r>
+              <a:rPr lang="en-US" dirty="0"/>
+              <a:t>Spherical tokamaks are desirable because beta scales with the aspect ratio</a:t>
+            </a:r>
+          </a:p>
+          <a:p>
+            <a:r>
+              <a:rPr lang="en-US" dirty="0"/>
+              <a:t>Better as a volumetric neutron source</a:t>
+            </a:r>
+          </a:p>
+          <a:p>
+            <a:r>
+              <a:rPr lang="en-US" dirty="0"/>
+              <a:t>MAST is discussed</a:t>
+            </a:r>
+          </a:p>
+        </p:txBody>
+      </p:sp>
+      <p:pic>
+        <p:nvPicPr>
+          <p:cNvPr id="4" name="Online Media 3" descr="Mega Amp Spherical Tokamak (MAST) Upgrade first plasma in slow motion">
+            <a:hlinkClick r:id="" action="ppaction://media"/>
+            <a:extLst>
+              <a:ext uri="{FF2B5EF4-FFF2-40B4-BE49-F238E27FC236}">
+                <a16:creationId xmlns:a16="http://schemas.microsoft.com/office/drawing/2014/main" id="{18E38325-3F4E-E948-903D-32643BC6CB8B}"/>
+              </a:ext>
+            </a:extLst>
+          </p:cNvPr>
+          <p:cNvPicPr>
+            <a:picLocks noRot="1" noChangeAspect="1"/>
+          </p:cNvPicPr>
+          <p:nvPr>
+            <a:videoFile r:link="rId1"/>
+          </p:nvPr>
+        </p:nvPicPr>
+        <p:blipFill>
+          <a:blip r:embed="rId3"/>
+          <a:stretch>
+            <a:fillRect/>
+          </a:stretch>
+        </p:blipFill>
+        <p:spPr>
+          <a:xfrm>
+            <a:off x="6259286" y="3531331"/>
+            <a:ext cx="4682535" cy="2645632"/>
+          </a:xfrm>
+          <a:prstGeom prst="rect">
+            <a:avLst/>
+          </a:prstGeom>
+        </p:spPr>
+      </p:pic>
+    </p:spTree>
+    <p:extLst>
+      <p:ext uri="{BB962C8B-B14F-4D97-AF65-F5344CB8AC3E}">
+        <p14:creationId xmlns:p14="http://schemas.microsoft.com/office/powerpoint/2010/main" val="3997183407"/>
+      </p:ext>
+    </p:extLst>
+  </p:cSld>
+  <p:clrMapOvr>
+    <a:masterClrMapping/>
+  </p:clrMapOvr>
+  <p:timing>
+    <p:tnLst>
+      <p:par>
+        <p:cTn id="1" dur="indefinite" restart="never" nodeType="tmRoot">
+          <p:childTnLst>
+            <p:seq concurrent="1" nextAc="seek">
+              <p:cTn id="2" dur="indefinite" nodeType="mainSeq">
+                <p:childTnLst>
+                  <p:par>
+                    <p:cTn id="3" fill="hold">
+                      <p:stCondLst>
+                        <p:cond delay="indefinite"/>
+                      </p:stCondLst>
+                      <p:childTnLst>
+                        <p:par>
+                          <p:cTn id="4" fill="hold">
+                            <p:stCondLst>
+                              <p:cond delay="0"/>
+                            </p:stCondLst>
+                            <p:childTnLst>
+                              <p:par>
+                                <p:cTn id="5" presetID="1" presetClass="mediacall" presetSubtype="0" fill="hold" nodeType="clickEffect">
+                                  <p:stCondLst>
+                                    <p:cond delay="0"/>
+                                  </p:stCondLst>
+                                  <p:childTnLst>
+                                    <p:cmd type="call" cmd="playFrom(0.0)">
+                                      <p:cBhvr>
+                                        <p:cTn id="6" dur="1" fill="hold"/>
+                                        <p:tgtEl>
+                                          <p:spTgt spid="4"/>
+                                        </p:tgtEl>
+                                      </p:cBhvr>
+                                    </p:cmd>
+                                  </p:childTnLst>
+                                </p:cTn>
+                              </p:par>
+                            </p:childTnLst>
+                          </p:cTn>
+                        </p:par>
+                      </p:childTnLst>
+                    </p:cTn>
+                  </p:par>
+                </p:childTnLst>
+              </p:cTn>
+              <p:prevCondLst>
+                <p:cond evt="onPrev" delay="0">
+                  <p:tgtEl>
+                    <p:sldTgt/>
+                  </p:tgtEl>
+                </p:cond>
+              </p:prevCondLst>
+              <p:nextCondLst>
+                <p:cond evt="onNext" delay="0">
+                  <p:tgtEl>
+                    <p:sldTgt/>
+                  </p:tgtEl>
+                </p:cond>
+              </p:nextCondLst>
+            </p:seq>
+            <p:video>
+              <p:cMediaNode vol="80000">
+                <p:cTn id="7" fill="hold" display="0">
+                  <p:stCondLst>
+                    <p:cond delay="indefinite"/>
+                  </p:stCondLst>
+                </p:cTn>
+                <p:tgtEl>
+                  <p:spTgt spid="4"/>
+                </p:tgtEl>
+              </p:cMediaNode>
+            </p:video>
+            <p:seq concurrent="1" nextAc="seek">
+              <p:cTn id="8" restart="whenNotActive" fill="hold" evtFilter="cancelBubble" nodeType="interactiveSeq">
+                <p:stCondLst>
+                  <p:cond evt="onClick" delay="0">
+                    <p:tgtEl>
+                      <p:spTgt spid="4"/>
+                    </p:tgtEl>
+                  </p:cond>
+                </p:stCondLst>
+                <p:endSync evt="end" delay="0">
+                  <p:rtn val="all"/>
+                </p:endSync>
+                <p:childTnLst>
+                  <p:par>
+                    <p:cTn id="9" fill="hold">
+                      <p:stCondLst>
+                        <p:cond delay="0"/>
+                      </p:stCondLst>
+                      <p:childTnLst>
+                        <p:par>
+                          <p:cTn id="10" fill="hold">
+                            <p:stCondLst>
+                              <p:cond delay="0"/>
+                            </p:stCondLst>
+                            <p:childTnLst>
+                              <p:par>
+                                <p:cTn id="11" presetID="2" presetClass="mediacall" presetSubtype="0" fill="hold" nodeType="clickEffect">
+                                  <p:stCondLst>
+                                    <p:cond delay="0"/>
+                                  </p:stCondLst>
+                                  <p:childTnLst>
+                                    <p:cmd type="call" cmd="togglePause">
+                                      <p:cBhvr>
+                                        <p:cTn id="12" dur="1" fill="hold"/>
+                                        <p:tgtEl>
+                                          <p:spTgt spid="4"/>
+                                        </p:tgtEl>
+                                      </p:cBhvr>
+                                    </p:cmd>
+                                  </p:childTnLst>
+                                </p:cTn>
+                              </p:par>
+                            </p:childTnLst>
+                          </p:cTn>
+                        </p:par>
+                      </p:childTnLst>
+                    </p:cTn>
+                  </p:par>
+                </p:childTnLst>
+              </p:cTn>
+              <p:nextCondLst>
+                <p:cond evt="onClick" delay="0">
+                  <p:tgtEl>
+                    <p:spTgt spid="4"/>
+                  </p:tgtEl>
+                </p:cond>
+              </p:nextCondLst>
+            </p:seq>
+          </p:childTnLst>
+        </p:cTn>
+      </p:par>
+    </p:tnLst>
+  </p:timing>
+</p:sld>
+</file>
+
+<file path=ppt/slides/slide12.xml><?xml version="1.0" encoding="utf-8"?>
+<p:sld xmlns:a="http://schemas.openxmlformats.org/drawingml/2006/main" xmlns:r="http://schemas.openxmlformats.org/officeDocument/2006/relationships" xmlns:p="http://schemas.openxmlformats.org/presentationml/2006/main">
+  <p:cSld>
+    <p:spTree>
+      <p:nvGrpSpPr>
+        <p:cNvPr id="1" name=""/>
+        <p:cNvGrpSpPr/>
+        <p:nvPr/>
+      </p:nvGrpSpPr>
+      <p:grpSpPr>
+        <a:xfrm>
+          <a:off x="0" y="0"/>
+          <a:ext cx="0" cy="0"/>
+          <a:chOff x="0" y="0"/>
+          <a:chExt cx="0" cy="0"/>
+        </a:xfrm>
+      </p:grpSpPr>
+      <p:sp>
+        <p:nvSpPr>
+          <p:cNvPr id="2" name="Title 1">
+            <a:extLst>
+              <a:ext uri="{FF2B5EF4-FFF2-40B4-BE49-F238E27FC236}">
+                <a16:creationId xmlns:a16="http://schemas.microsoft.com/office/drawing/2014/main" id="{CF632388-55BF-7242-AE1B-5B6C8913FD0C}"/>
+              </a:ext>
+            </a:extLst>
+          </p:cNvPr>
+          <p:cNvSpPr>
+            <a:spLocks noGrp="1"/>
+          </p:cNvSpPr>
+          <p:nvPr>
+            <p:ph type="title"/>
+          </p:nvPr>
+        </p:nvSpPr>
+        <p:spPr/>
+        <p:txBody>
+          <a:bodyPr/>
+          <a:lstStyle/>
+          <a:p>
+            <a:r>
+              <a:rPr lang="en-US" dirty="0"/>
+              <a:t>6.6.4 The Equilibrium Beta Limit</a:t>
+            </a:r>
+          </a:p>
+        </p:txBody>
+      </p:sp>
+      <p:sp>
+        <p:nvSpPr>
+          <p:cNvPr id="3" name="Content Placeholder 2">
+            <a:extLst>
+              <a:ext uri="{FF2B5EF4-FFF2-40B4-BE49-F238E27FC236}">
+                <a16:creationId xmlns:a16="http://schemas.microsoft.com/office/drawing/2014/main" id="{DDAF4BAB-310A-2742-A484-C7BEB15B0D65}"/>
+              </a:ext>
+            </a:extLst>
+          </p:cNvPr>
+          <p:cNvSpPr>
+            <a:spLocks noGrp="1"/>
+          </p:cNvSpPr>
+          <p:nvPr>
+            <p:ph idx="1"/>
+          </p:nvPr>
+        </p:nvSpPr>
+        <p:spPr/>
+        <p:txBody>
+          <a:bodyPr/>
+          <a:lstStyle/>
+          <a:p>
+            <a:r>
+              <a:rPr lang="en-US" dirty="0"/>
+              <a:t>Does a good job… I skimmed</a:t>
+            </a:r>
+          </a:p>
+        </p:txBody>
+      </p:sp>
+    </p:spTree>
+    <p:extLst>
+      <p:ext uri="{BB962C8B-B14F-4D97-AF65-F5344CB8AC3E}">
+        <p14:creationId xmlns:p14="http://schemas.microsoft.com/office/powerpoint/2010/main" val="2834646150"/>
+      </p:ext>
+    </p:extLst>
+  </p:cSld>
+  <p:clrMapOvr>
+    <a:masterClrMapping/>
+  </p:clrMapOvr>
+</p:sld>
+</file>
+
+<file path=ppt/slides/slide13.xml><?xml version="1.0" encoding="utf-8"?>
+<p:sld xmlns:a="http://schemas.openxmlformats.org/drawingml/2006/main" xmlns:r="http://schemas.openxmlformats.org/officeDocument/2006/relationships" xmlns:p="http://schemas.openxmlformats.org/presentationml/2006/main">
+  <p:cSld>
+    <p:spTree>
+      <p:nvGrpSpPr>
+        <p:cNvPr id="1" name=""/>
+        <p:cNvGrpSpPr/>
+        <p:nvPr/>
+      </p:nvGrpSpPr>
+      <p:grpSpPr>
+        <a:xfrm>
+          <a:off x="0" y="0"/>
+          <a:ext cx="0" cy="0"/>
+          <a:chOff x="0" y="0"/>
+          <a:chExt cx="0" cy="0"/>
+        </a:xfrm>
+      </p:grpSpPr>
+      <p:sp>
+        <p:nvSpPr>
+          <p:cNvPr id="2" name="Title 1">
+            <a:extLst>
+              <a:ext uri="{FF2B5EF4-FFF2-40B4-BE49-F238E27FC236}">
+                <a16:creationId xmlns:a16="http://schemas.microsoft.com/office/drawing/2014/main" id="{1D4AD107-3C49-E944-B48F-BC4F37483AF4}"/>
+              </a:ext>
+            </a:extLst>
+          </p:cNvPr>
+          <p:cNvSpPr>
+            <a:spLocks noGrp="1"/>
+          </p:cNvSpPr>
+          <p:nvPr>
+            <p:ph type="title"/>
+          </p:nvPr>
+        </p:nvSpPr>
+        <p:spPr/>
+        <p:txBody>
+          <a:bodyPr/>
+          <a:lstStyle/>
+          <a:p>
+            <a:r>
+              <a:rPr lang="en-US" dirty="0"/>
+              <a:t>6.6.5 Up-Down Asymmetric Solution</a:t>
+            </a:r>
+          </a:p>
+        </p:txBody>
+      </p:sp>
+      <p:sp>
+        <p:nvSpPr>
+          <p:cNvPr id="3" name="Content Placeholder 2">
+            <a:extLst>
+              <a:ext uri="{FF2B5EF4-FFF2-40B4-BE49-F238E27FC236}">
+                <a16:creationId xmlns:a16="http://schemas.microsoft.com/office/drawing/2014/main" id="{3CA86692-46DD-7646-BCF4-67ABE0375218}"/>
+              </a:ext>
+            </a:extLst>
+          </p:cNvPr>
+          <p:cNvSpPr>
+            <a:spLocks noGrp="1"/>
+          </p:cNvSpPr>
+          <p:nvPr>
+            <p:ph idx="1"/>
+          </p:nvPr>
+        </p:nvSpPr>
+        <p:spPr/>
+        <p:txBody>
+          <a:bodyPr/>
+          <a:lstStyle/>
+          <a:p>
+            <a:r>
+              <a:rPr lang="en-US" dirty="0"/>
+              <a:t>Single null divertor</a:t>
+            </a:r>
+          </a:p>
+          <a:p>
+            <a:r>
+              <a:rPr lang="en-US" dirty="0"/>
+              <a:t>Add new boundary description basically</a:t>
+            </a:r>
+          </a:p>
+          <a:p>
+            <a:r>
+              <a:rPr lang="en-US" dirty="0"/>
+              <a:t>X-point for example</a:t>
+            </a:r>
+          </a:p>
+        </p:txBody>
+      </p:sp>
+    </p:spTree>
+    <p:extLst>
+      <p:ext uri="{BB962C8B-B14F-4D97-AF65-F5344CB8AC3E}">
+        <p14:creationId xmlns:p14="http://schemas.microsoft.com/office/powerpoint/2010/main" val="2733038225"/>
+      </p:ext>
+    </p:extLst>
+  </p:cSld>
+  <p:clrMapOvr>
+    <a:masterClrMapping/>
+  </p:clrMapOvr>
+</p:sld>
+</file>
+
+<file path=ppt/slides/slide14.xml><?xml version="1.0" encoding="utf-8"?>
+<p:sld xmlns:a="http://schemas.openxmlformats.org/drawingml/2006/main" xmlns:r="http://schemas.openxmlformats.org/officeDocument/2006/relationships" xmlns:p="http://schemas.openxmlformats.org/presentationml/2006/main">
+  <p:cSld>
+    <p:spTree>
+      <p:nvGrpSpPr>
+        <p:cNvPr id="1" name=""/>
+        <p:cNvGrpSpPr/>
+        <p:nvPr/>
+      </p:nvGrpSpPr>
+      <p:grpSpPr>
+        <a:xfrm>
+          <a:off x="0" y="0"/>
+          <a:ext cx="0" cy="0"/>
+          <a:chOff x="0" y="0"/>
+          <a:chExt cx="0" cy="0"/>
+        </a:xfrm>
+      </p:grpSpPr>
+      <p:sp>
+        <p:nvSpPr>
+          <p:cNvPr id="2" name="Title 1">
+            <a:extLst>
+              <a:ext uri="{FF2B5EF4-FFF2-40B4-BE49-F238E27FC236}">
+                <a16:creationId xmlns:a16="http://schemas.microsoft.com/office/drawing/2014/main" id="{412048B3-260B-A24F-8560-2BF113F27307}"/>
+              </a:ext>
+            </a:extLst>
+          </p:cNvPr>
+          <p:cNvSpPr>
+            <a:spLocks noGrp="1"/>
+          </p:cNvSpPr>
+          <p:nvPr>
+            <p:ph type="title"/>
+          </p:nvPr>
+        </p:nvSpPr>
+        <p:spPr/>
+        <p:txBody>
+          <a:bodyPr/>
+          <a:lstStyle/>
+          <a:p>
+            <a:r>
+              <a:rPr lang="en-US" dirty="0"/>
+              <a:t>6.6.6 Example: ITER</a:t>
+            </a:r>
+          </a:p>
+        </p:txBody>
+      </p:sp>
+      <p:sp>
+        <p:nvSpPr>
+          <p:cNvPr id="3" name="Content Placeholder 2">
+            <a:extLst>
+              <a:ext uri="{FF2B5EF4-FFF2-40B4-BE49-F238E27FC236}">
+                <a16:creationId xmlns:a16="http://schemas.microsoft.com/office/drawing/2014/main" id="{6CC91271-8595-5840-883D-1A35135176D5}"/>
+              </a:ext>
+            </a:extLst>
+          </p:cNvPr>
+          <p:cNvSpPr>
+            <a:spLocks noGrp="1"/>
+          </p:cNvSpPr>
+          <p:nvPr>
+            <p:ph idx="1"/>
+          </p:nvPr>
+        </p:nvSpPr>
+        <p:spPr/>
+        <p:txBody>
+          <a:bodyPr/>
+          <a:lstStyle/>
+          <a:p>
+            <a:r>
+              <a:rPr lang="en-US" dirty="0"/>
+              <a:t>ITER discussed</a:t>
+            </a:r>
+          </a:p>
+        </p:txBody>
+      </p:sp>
+    </p:spTree>
+    <p:extLst>
+      <p:ext uri="{BB962C8B-B14F-4D97-AF65-F5344CB8AC3E}">
+        <p14:creationId xmlns:p14="http://schemas.microsoft.com/office/powerpoint/2010/main" val="9921142"/>
+      </p:ext>
+    </p:extLst>
+  </p:cSld>
+  <p:clrMapOvr>
+    <a:masterClrMapping/>
+  </p:clrMapOvr>
+</p:sld>
+</file>
+
+<file path=ppt/slides/slide15.xml><?xml version="1.0" encoding="utf-8"?>
+<p:sld xmlns:a="http://schemas.openxmlformats.org/drawingml/2006/main" xmlns:r="http://schemas.openxmlformats.org/officeDocument/2006/relationships" xmlns:p="http://schemas.openxmlformats.org/presentationml/2006/main">
+  <p:cSld>
+    <p:spTree>
+      <p:nvGrpSpPr>
+        <p:cNvPr id="1" name=""/>
+        <p:cNvGrpSpPr/>
+        <p:nvPr/>
+      </p:nvGrpSpPr>
+      <p:grpSpPr>
+        <a:xfrm>
+          <a:off x="0" y="0"/>
+          <a:ext cx="0" cy="0"/>
+          <a:chOff x="0" y="0"/>
+          <a:chExt cx="0" cy="0"/>
+        </a:xfrm>
+      </p:grpSpPr>
+      <p:sp>
+        <p:nvSpPr>
+          <p:cNvPr id="2" name="Title 1">
+            <a:extLst>
+              <a:ext uri="{FF2B5EF4-FFF2-40B4-BE49-F238E27FC236}">
+                <a16:creationId xmlns:a16="http://schemas.microsoft.com/office/drawing/2014/main" id="{96386228-F91F-1A4F-8DA2-1CE7A43EEC54}"/>
+              </a:ext>
+            </a:extLst>
+          </p:cNvPr>
+          <p:cNvSpPr>
+            <a:spLocks noGrp="1"/>
+          </p:cNvSpPr>
+          <p:nvPr>
+            <p:ph type="title"/>
+          </p:nvPr>
+        </p:nvSpPr>
+        <p:spPr/>
+        <p:txBody>
+          <a:bodyPr/>
+          <a:lstStyle/>
+          <a:p>
+            <a:r>
+              <a:rPr lang="en-US" dirty="0"/>
+              <a:t>6.6.7 Example: NSTX</a:t>
+            </a:r>
+          </a:p>
+        </p:txBody>
+      </p:sp>
+      <p:sp>
+        <p:nvSpPr>
+          <p:cNvPr id="3" name="Content Placeholder 2">
+            <a:extLst>
+              <a:ext uri="{FF2B5EF4-FFF2-40B4-BE49-F238E27FC236}">
+                <a16:creationId xmlns:a16="http://schemas.microsoft.com/office/drawing/2014/main" id="{B86815C6-BE6A-5748-9865-7398ECF43118}"/>
+              </a:ext>
+            </a:extLst>
+          </p:cNvPr>
+          <p:cNvSpPr>
+            <a:spLocks noGrp="1"/>
+          </p:cNvSpPr>
+          <p:nvPr>
+            <p:ph idx="1"/>
+          </p:nvPr>
+        </p:nvSpPr>
+        <p:spPr/>
+        <p:txBody>
+          <a:bodyPr/>
+          <a:lstStyle/>
+          <a:p>
+            <a:endParaRPr lang="en-US"/>
+          </a:p>
+        </p:txBody>
+      </p:sp>
+    </p:spTree>
+    <p:extLst>
+      <p:ext uri="{BB962C8B-B14F-4D97-AF65-F5344CB8AC3E}">
+        <p14:creationId xmlns:p14="http://schemas.microsoft.com/office/powerpoint/2010/main" val="1702736547"/>
+      </p:ext>
+    </p:extLst>
+  </p:cSld>
+  <p:clrMapOvr>
+    <a:masterClrMapping/>
+  </p:clrMapOvr>
+</p:sld>
+</file>
+
+<file path=ppt/slides/slide16.xml><?xml version="1.0" encoding="utf-8"?>
+<p:sld xmlns:a="http://schemas.openxmlformats.org/drawingml/2006/main" xmlns:r="http://schemas.openxmlformats.org/officeDocument/2006/relationships" xmlns:p="http://schemas.openxmlformats.org/presentationml/2006/main">
+  <p:cSld>
+    <p:spTree>
+      <p:nvGrpSpPr>
+        <p:cNvPr id="1" name=""/>
+        <p:cNvGrpSpPr/>
+        <p:nvPr/>
+      </p:nvGrpSpPr>
+      <p:grpSpPr>
+        <a:xfrm>
+          <a:off x="0" y="0"/>
+          <a:ext cx="0" cy="0"/>
+          <a:chOff x="0" y="0"/>
+          <a:chExt cx="0" cy="0"/>
+        </a:xfrm>
+      </p:grpSpPr>
+      <p:sp>
+        <p:nvSpPr>
+          <p:cNvPr id="2" name="Title 1">
+            <a:extLst>
+              <a:ext uri="{FF2B5EF4-FFF2-40B4-BE49-F238E27FC236}">
+                <a16:creationId xmlns:a16="http://schemas.microsoft.com/office/drawing/2014/main" id="{6A8A35DC-8314-3740-8948-FED0365A5BF9}"/>
+              </a:ext>
+            </a:extLst>
+          </p:cNvPr>
+          <p:cNvSpPr>
+            <a:spLocks noGrp="1"/>
+          </p:cNvSpPr>
+          <p:nvPr>
+            <p:ph type="title"/>
+          </p:nvPr>
+        </p:nvSpPr>
+        <p:spPr/>
+        <p:txBody>
+          <a:bodyPr/>
+          <a:lstStyle/>
+          <a:p>
+            <a:r>
+              <a:rPr lang="en-US" dirty="0"/>
+              <a:t>6.6.8 Summary</a:t>
+            </a:r>
+          </a:p>
+        </p:txBody>
+      </p:sp>
+      <p:sp>
+        <p:nvSpPr>
+          <p:cNvPr id="3" name="Content Placeholder 2">
+            <a:extLst>
+              <a:ext uri="{FF2B5EF4-FFF2-40B4-BE49-F238E27FC236}">
+                <a16:creationId xmlns:a16="http://schemas.microsoft.com/office/drawing/2014/main" id="{30522303-1FF4-114A-B647-6FED3A00D8F0}"/>
+              </a:ext>
+            </a:extLst>
+          </p:cNvPr>
+          <p:cNvSpPr>
+            <a:spLocks noGrp="1"/>
+          </p:cNvSpPr>
+          <p:nvPr>
+            <p:ph idx="1"/>
+          </p:nvPr>
+        </p:nvSpPr>
+        <p:spPr/>
+        <p:txBody>
+          <a:bodyPr/>
+          <a:lstStyle/>
+          <a:p>
+            <a:endParaRPr lang="en-US"/>
+          </a:p>
+        </p:txBody>
+      </p:sp>
+    </p:spTree>
+    <p:extLst>
+      <p:ext uri="{BB962C8B-B14F-4D97-AF65-F5344CB8AC3E}">
+        <p14:creationId xmlns:p14="http://schemas.microsoft.com/office/powerpoint/2010/main" val="1236835925"/>
+      </p:ext>
+    </p:extLst>
+  </p:cSld>
+  <p:clrMapOvr>
+    <a:masterClrMapping/>
+  </p:clrMapOvr>
+</p:sld>
+</file>
+
+<file path=ppt/slides/slide17.xml><?xml version="1.0" encoding="utf-8"?>
+<p:sld xmlns:a="http://schemas.openxmlformats.org/drawingml/2006/main" xmlns:r="http://schemas.openxmlformats.org/officeDocument/2006/relationships" xmlns:p="http://schemas.openxmlformats.org/presentationml/2006/main">
+  <p:cSld>
+    <p:spTree>
+      <p:nvGrpSpPr>
+        <p:cNvPr id="1" name=""/>
+        <p:cNvGrpSpPr/>
+        <p:nvPr/>
+      </p:nvGrpSpPr>
+      <p:grpSpPr>
+        <a:xfrm>
+          <a:off x="0" y="0"/>
+          <a:ext cx="0" cy="0"/>
+          <a:chOff x="0" y="0"/>
+          <a:chExt cx="0" cy="0"/>
+        </a:xfrm>
+      </p:grpSpPr>
+      <p:sp>
+        <p:nvSpPr>
+          <p:cNvPr id="2" name="Title 1">
+            <a:extLst>
+              <a:ext uri="{FF2B5EF4-FFF2-40B4-BE49-F238E27FC236}">
+                <a16:creationId xmlns:a16="http://schemas.microsoft.com/office/drawing/2014/main" id="{14ACD1E6-4F85-B449-AA16-3C095333BAD5}"/>
+              </a:ext>
+            </a:extLst>
+          </p:cNvPr>
+          <p:cNvSpPr>
+            <a:spLocks noGrp="1"/>
+          </p:cNvSpPr>
+          <p:nvPr>
+            <p:ph type="title"/>
+          </p:nvPr>
+        </p:nvSpPr>
+        <p:spPr/>
+        <p:txBody>
+          <a:bodyPr/>
+          <a:lstStyle/>
+          <a:p>
+            <a:r>
+              <a:rPr lang="en-US" dirty="0"/>
+              <a:t>6.7 The Helical Grad-</a:t>
+            </a:r>
+            <a:r>
+              <a:rPr lang="en-US" dirty="0" err="1"/>
+              <a:t>Shafranov</a:t>
+            </a:r>
+            <a:r>
+              <a:rPr lang="en-US" dirty="0"/>
+              <a:t> Equation (The Strait Stellarator)</a:t>
+            </a:r>
+          </a:p>
+        </p:txBody>
+      </p:sp>
+      <mc:AlternateContent xmlns:mc="http://schemas.openxmlformats.org/markup-compatibility/2006" xmlns:a14="http://schemas.microsoft.com/office/drawing/2010/main">
+        <mc:Choice Requires="a14">
+          <p:sp>
+            <p:nvSpPr>
+              <p:cNvPr id="3" name="Content Placeholder 2">
+                <a:extLst>
+                  <a:ext uri="{FF2B5EF4-FFF2-40B4-BE49-F238E27FC236}">
+                    <a16:creationId xmlns:a16="http://schemas.microsoft.com/office/drawing/2014/main" id="{6B8549B7-A69B-734A-8549-714F188FE949}"/>
+                  </a:ext>
+                </a:extLst>
+              </p:cNvPr>
+              <p:cNvSpPr>
+                <a:spLocks noGrp="1"/>
+              </p:cNvSpPr>
+              <p:nvPr>
+                <p:ph idx="1"/>
+              </p:nvPr>
+            </p:nvSpPr>
+            <p:spPr/>
+            <p:txBody>
+              <a:bodyPr/>
+              <a:lstStyle/>
+              <a:p>
+                <a:r>
+                  <a:rPr lang="en-US" dirty="0"/>
+                  <a:t>We stick to 2D, so the stellarator becomes long and strait</a:t>
+                </a:r>
+              </a:p>
+              <a:p>
+                <a14:m>
+                  <m:oMath xmlns:m="http://schemas.openxmlformats.org/officeDocument/2006/math">
+                    <m:r>
+                      <m:rPr>
+                        <m:sty m:val="p"/>
+                      </m:rPr>
+                      <a:rPr lang="en-US" b="0" i="0" smtClean="0">
+                        <a:latin typeface="Cambria Math" panose="02040503050406030204" pitchFamily="18" charset="0"/>
+                      </a:rPr>
+                      <m:t>Ψ</m:t>
+                    </m:r>
+                    <m:d>
+                      <m:dPr>
+                        <m:ctrlPr>
+                          <a:rPr lang="en-US" b="0" i="1" smtClean="0">
+                            <a:latin typeface="Cambria Math" panose="02040503050406030204" pitchFamily="18" charset="0"/>
+                          </a:rPr>
+                        </m:ctrlPr>
+                      </m:dPr>
+                      <m:e>
+                        <m:r>
+                          <a:rPr lang="en-US" b="0" i="1" smtClean="0">
+                            <a:latin typeface="Cambria Math" panose="02040503050406030204" pitchFamily="18" charset="0"/>
+                          </a:rPr>
+                          <m:t>𝑅</m:t>
+                        </m:r>
+                        <m:r>
+                          <a:rPr lang="en-US" b="0" i="1" smtClean="0">
+                            <a:latin typeface="Cambria Math" panose="02040503050406030204" pitchFamily="18" charset="0"/>
+                          </a:rPr>
+                          <m:t>,</m:t>
+                        </m:r>
+                        <m:r>
+                          <a:rPr lang="en-US" b="0" i="1" smtClean="0">
+                            <a:latin typeface="Cambria Math" panose="02040503050406030204" pitchFamily="18" charset="0"/>
+                          </a:rPr>
+                          <m:t>𝜙</m:t>
+                        </m:r>
+                        <m:r>
+                          <a:rPr lang="en-US" b="0" i="1" smtClean="0">
+                            <a:latin typeface="Cambria Math" panose="02040503050406030204" pitchFamily="18" charset="0"/>
+                          </a:rPr>
+                          <m:t>,</m:t>
+                        </m:r>
+                        <m:r>
+                          <a:rPr lang="en-US" b="0" i="1" smtClean="0">
+                            <a:latin typeface="Cambria Math" panose="02040503050406030204" pitchFamily="18" charset="0"/>
+                          </a:rPr>
+                          <m:t>𝑍</m:t>
+                        </m:r>
+                      </m:e>
+                    </m:d>
+                    <m:r>
+                      <a:rPr lang="en-US" b="0" i="1" smtClean="0">
+                        <a:latin typeface="Cambria Math" panose="02040503050406030204" pitchFamily="18" charset="0"/>
+                      </a:rPr>
+                      <m:t>→</m:t>
+                    </m:r>
+                    <m:r>
+                      <m:rPr>
+                        <m:sty m:val="p"/>
+                      </m:rPr>
+                      <a:rPr lang="en-US" b="0" i="0" smtClean="0">
+                        <a:latin typeface="Cambria Math" panose="02040503050406030204" pitchFamily="18" charset="0"/>
+                      </a:rPr>
+                      <m:t>Ψ</m:t>
+                    </m:r>
+                    <m:d>
+                      <m:dPr>
+                        <m:ctrlPr>
+                          <a:rPr lang="en-US" b="0" i="1" smtClean="0">
+                            <a:latin typeface="Cambria Math" panose="02040503050406030204" pitchFamily="18" charset="0"/>
+                          </a:rPr>
+                        </m:ctrlPr>
+                      </m:dPr>
+                      <m:e>
+                        <m:r>
+                          <a:rPr lang="en-US" b="0" i="1" smtClean="0">
+                            <a:latin typeface="Cambria Math" panose="02040503050406030204" pitchFamily="18" charset="0"/>
+                          </a:rPr>
+                          <m:t>𝑅</m:t>
+                        </m:r>
+                        <m:r>
+                          <a:rPr lang="en-US" b="0" i="1" smtClean="0">
+                            <a:latin typeface="Cambria Math" panose="02040503050406030204" pitchFamily="18" charset="0"/>
+                          </a:rPr>
+                          <m:t>,</m:t>
+                        </m:r>
+                        <m:r>
+                          <a:rPr lang="en-US" b="0" i="1" smtClean="0">
+                            <a:latin typeface="Cambria Math" panose="02040503050406030204" pitchFamily="18" charset="0"/>
+                          </a:rPr>
+                          <m:t>𝑍</m:t>
+                        </m:r>
+                      </m:e>
+                    </m:d>
+                    <m:r>
+                      <a:rPr lang="en-US" b="0" i="1" smtClean="0">
+                        <a:latin typeface="Cambria Math" panose="02040503050406030204" pitchFamily="18" charset="0"/>
+                      </a:rPr>
+                      <m:t> </m:t>
+                    </m:r>
+                    <m:r>
+                      <a:rPr lang="en-US" b="0" i="1" smtClean="0">
+                        <a:latin typeface="Cambria Math" panose="02040503050406030204" pitchFamily="18" charset="0"/>
+                      </a:rPr>
+                      <m:t>𝑜𝑟</m:t>
+                    </m:r>
+                    <m:r>
+                      <a:rPr lang="en-US" b="0" i="1" smtClean="0">
+                        <a:latin typeface="Cambria Math" panose="02040503050406030204" pitchFamily="18" charset="0"/>
+                      </a:rPr>
+                      <m:t> </m:t>
+                    </m:r>
+                    <m:r>
+                      <m:rPr>
+                        <m:sty m:val="p"/>
+                      </m:rPr>
+                      <a:rPr lang="en-US" b="0" i="0" smtClean="0">
+                        <a:latin typeface="Cambria Math" panose="02040503050406030204" pitchFamily="18" charset="0"/>
+                      </a:rPr>
+                      <m:t>Ψ</m:t>
+                    </m:r>
+                    <m:d>
+                      <m:dPr>
+                        <m:ctrlPr>
+                          <a:rPr lang="en-US" b="0" i="1" smtClean="0">
+                            <a:latin typeface="Cambria Math" panose="02040503050406030204" pitchFamily="18" charset="0"/>
+                          </a:rPr>
+                        </m:ctrlPr>
+                      </m:dPr>
+                      <m:e>
+                        <m:r>
+                          <a:rPr lang="en-US" b="0" i="1" smtClean="0">
+                            <a:latin typeface="Cambria Math" panose="02040503050406030204" pitchFamily="18" charset="0"/>
+                          </a:rPr>
+                          <m:t>𝑅</m:t>
+                        </m:r>
+                        <m:r>
+                          <a:rPr lang="en-US" b="0" i="1" smtClean="0">
+                            <a:latin typeface="Cambria Math" panose="02040503050406030204" pitchFamily="18" charset="0"/>
+                          </a:rPr>
+                          <m:t>,</m:t>
+                        </m:r>
+                        <m:r>
+                          <a:rPr lang="en-US" b="0" i="1" smtClean="0">
+                            <a:latin typeface="Cambria Math" panose="02040503050406030204" pitchFamily="18" charset="0"/>
+                          </a:rPr>
+                          <m:t>𝜙</m:t>
+                        </m:r>
+                        <m:r>
+                          <a:rPr lang="en-US" b="0" i="1" smtClean="0">
+                            <a:latin typeface="Cambria Math" panose="02040503050406030204" pitchFamily="18" charset="0"/>
+                          </a:rPr>
+                          <m:t>,</m:t>
+                        </m:r>
+                        <m:r>
+                          <a:rPr lang="en-US" b="0" i="1" smtClean="0">
+                            <a:latin typeface="Cambria Math" panose="02040503050406030204" pitchFamily="18" charset="0"/>
+                          </a:rPr>
+                          <m:t>𝑍</m:t>
+                        </m:r>
+                      </m:e>
+                    </m:d>
+                    <m:r>
+                      <a:rPr lang="en-US" b="0" i="1" smtClean="0">
+                        <a:latin typeface="Cambria Math" panose="02040503050406030204" pitchFamily="18" charset="0"/>
+                      </a:rPr>
+                      <m:t>→</m:t>
+                    </m:r>
+                    <m:r>
+                      <m:rPr>
+                        <m:sty m:val="p"/>
+                      </m:rPr>
+                      <a:rPr lang="en-US" b="0" i="0" smtClean="0">
+                        <a:latin typeface="Cambria Math" panose="02040503050406030204" pitchFamily="18" charset="0"/>
+                      </a:rPr>
+                      <m:t>Ψ</m:t>
+                    </m:r>
+                    <m:d>
+                      <m:dPr>
+                        <m:ctrlPr>
+                          <a:rPr lang="en-US" b="0" i="1" smtClean="0">
+                            <a:latin typeface="Cambria Math" panose="02040503050406030204" pitchFamily="18" charset="0"/>
+                          </a:rPr>
+                        </m:ctrlPr>
+                      </m:dPr>
+                      <m:e>
+                        <m:r>
+                          <a:rPr lang="en-US" b="0" i="1" smtClean="0">
+                            <a:latin typeface="Cambria Math" panose="02040503050406030204" pitchFamily="18" charset="0"/>
+                          </a:rPr>
+                          <m:t>𝑅</m:t>
+                        </m:r>
+                        <m:r>
+                          <a:rPr lang="en-US" b="0" i="1" smtClean="0">
+                            <a:latin typeface="Cambria Math" panose="02040503050406030204" pitchFamily="18" charset="0"/>
+                          </a:rPr>
+                          <m:t>,</m:t>
+                        </m:r>
+                        <m:r>
+                          <a:rPr lang="en-US" b="0" i="1" smtClean="0">
+                            <a:latin typeface="Cambria Math" panose="02040503050406030204" pitchFamily="18" charset="0"/>
+                          </a:rPr>
+                          <m:t>𝑙</m:t>
+                        </m:r>
+                        <m:r>
+                          <a:rPr lang="en-US" b="0" i="1" smtClean="0">
+                            <a:latin typeface="Cambria Math" panose="02040503050406030204" pitchFamily="18" charset="0"/>
+                          </a:rPr>
+                          <m:t>𝜃</m:t>
+                        </m:r>
+                        <m:r>
+                          <a:rPr lang="en-US" b="0" i="1" smtClean="0">
+                            <a:latin typeface="Cambria Math" panose="02040503050406030204" pitchFamily="18" charset="0"/>
+                          </a:rPr>
+                          <m:t>+</m:t>
+                        </m:r>
+                        <m:r>
+                          <a:rPr lang="en-US" b="0" i="1" smtClean="0">
+                            <a:latin typeface="Cambria Math" panose="02040503050406030204" pitchFamily="18" charset="0"/>
+                          </a:rPr>
+                          <m:t>h𝑧</m:t>
+                        </m:r>
+                      </m:e>
+                    </m:d>
+                  </m:oMath>
+                </a14:m>
+                <a:endParaRPr lang="en-US" b="0" i="1" dirty="0">
+                  <a:latin typeface="Cambria Math" panose="02040503050406030204" pitchFamily="18" charset="0"/>
+                </a:endParaRPr>
+              </a:p>
+              <a:p>
+                <a14:m>
+                  <m:oMath xmlns:m="http://schemas.openxmlformats.org/officeDocument/2006/math">
+                    <m:r>
+                      <a:rPr lang="en-US" b="0" i="1" smtClean="0">
+                        <a:latin typeface="Cambria Math" panose="02040503050406030204" pitchFamily="18" charset="0"/>
+                      </a:rPr>
+                      <m:t>𝛼</m:t>
+                    </m:r>
+                    <m:r>
+                      <a:rPr lang="en-US" b="0" i="1" smtClean="0">
+                        <a:latin typeface="Cambria Math" panose="02040503050406030204" pitchFamily="18" charset="0"/>
+                      </a:rPr>
+                      <m:t>= </m:t>
+                    </m:r>
+                    <m:d>
+                      <m:dPr>
+                        <m:ctrlPr>
+                          <a:rPr lang="en-US" i="1">
+                            <a:latin typeface="Cambria Math" panose="02040503050406030204" pitchFamily="18" charset="0"/>
+                          </a:rPr>
+                        </m:ctrlPr>
+                      </m:dPr>
+                      <m:e>
+                        <m:r>
+                          <a:rPr lang="en-US" i="1">
+                            <a:latin typeface="Cambria Math" panose="02040503050406030204" pitchFamily="18" charset="0"/>
+                          </a:rPr>
+                          <m:t>𝑙</m:t>
+                        </m:r>
+                        <m:r>
+                          <a:rPr lang="en-US" i="1">
+                            <a:latin typeface="Cambria Math" panose="02040503050406030204" pitchFamily="18" charset="0"/>
+                          </a:rPr>
+                          <m:t>𝜃</m:t>
+                        </m:r>
+                        <m:r>
+                          <a:rPr lang="en-US" i="1">
+                            <a:latin typeface="Cambria Math" panose="02040503050406030204" pitchFamily="18" charset="0"/>
+                          </a:rPr>
+                          <m:t>+</m:t>
+                        </m:r>
+                        <m:r>
+                          <a:rPr lang="en-US" i="1">
+                            <a:latin typeface="Cambria Math" panose="02040503050406030204" pitchFamily="18" charset="0"/>
+                          </a:rPr>
+                          <m:t>h𝑧</m:t>
+                        </m:r>
+                      </m:e>
+                    </m:d>
+                  </m:oMath>
+                </a14:m>
+                <a:endParaRPr lang="en-US" dirty="0"/>
+              </a:p>
+              <a:p>
+                <a:pPr marL="0" indent="0">
+                  <a:buNone/>
+                </a:pPr>
+                <a:endParaRPr lang="en-US" dirty="0"/>
+              </a:p>
+            </p:txBody>
+          </p:sp>
+        </mc:Choice>
+        <mc:Fallback xmlns="">
+          <p:sp>
+            <p:nvSpPr>
+              <p:cNvPr id="3" name="Content Placeholder 2">
+                <a:extLst>
+                  <a:ext uri="{FF2B5EF4-FFF2-40B4-BE49-F238E27FC236}">
+                    <a16:creationId xmlns:a16="http://schemas.microsoft.com/office/drawing/2014/main" id="{6B8549B7-A69B-734A-8549-714F188FE949}"/>
+                  </a:ext>
+                </a:extLst>
+              </p:cNvPr>
+              <p:cNvSpPr>
+                <a:spLocks noGrp="1" noRot="1" noChangeAspect="1" noMove="1" noResize="1" noEditPoints="1" noAdjustHandles="1" noChangeArrowheads="1" noChangeShapeType="1" noTextEdit="1"/>
+              </p:cNvSpPr>
+              <p:nvPr>
+                <p:ph idx="1"/>
+              </p:nvPr>
+            </p:nvSpPr>
+            <p:spPr>
+              <a:blipFill>
+                <a:blip r:embed="rId2"/>
+                <a:stretch>
+                  <a:fillRect l="-1086" t="-2326"/>
+                </a:stretch>
+              </a:blipFill>
+            </p:spPr>
+            <p:txBody>
+              <a:bodyPr/>
+              <a:lstStyle/>
+              <a:p>
+                <a:r>
+                  <a:rPr lang="en-US">
+                    <a:noFill/>
+                  </a:rPr>
+                  <a:t> </a:t>
+                </a:r>
+              </a:p>
+            </p:txBody>
+          </p:sp>
+        </mc:Fallback>
+      </mc:AlternateContent>
+    </p:spTree>
+    <p:extLst>
+      <p:ext uri="{BB962C8B-B14F-4D97-AF65-F5344CB8AC3E}">
+        <p14:creationId xmlns:p14="http://schemas.microsoft.com/office/powerpoint/2010/main" val="3183585206"/>
+      </p:ext>
+    </p:extLst>
+  </p:cSld>
+  <p:clrMapOvr>
+    <a:masterClrMapping/>
+  </p:clrMapOvr>
+</p:sld>
+</file>
+
+<file path=ppt/slides/slide18.xml><?xml version="1.0" encoding="utf-8"?>
+<p:sld xmlns:a="http://schemas.openxmlformats.org/drawingml/2006/main" xmlns:r="http://schemas.openxmlformats.org/officeDocument/2006/relationships" xmlns:p="http://schemas.openxmlformats.org/presentationml/2006/main">
+  <p:cSld>
+    <p:spTree>
+      <p:nvGrpSpPr>
+        <p:cNvPr id="1" name=""/>
+        <p:cNvGrpSpPr/>
+        <p:nvPr/>
+      </p:nvGrpSpPr>
+      <p:grpSpPr>
+        <a:xfrm>
+          <a:off x="0" y="0"/>
+          <a:ext cx="0" cy="0"/>
+          <a:chOff x="0" y="0"/>
+          <a:chExt cx="0" cy="0"/>
+        </a:xfrm>
+      </p:grpSpPr>
+      <p:sp>
+        <p:nvSpPr>
+          <p:cNvPr id="2" name="Title 1">
+            <a:extLst>
+              <a:ext uri="{FF2B5EF4-FFF2-40B4-BE49-F238E27FC236}">
+                <a16:creationId xmlns:a16="http://schemas.microsoft.com/office/drawing/2014/main" id="{13D240F5-F4CA-C847-B0A3-65EC1E8849BE}"/>
+              </a:ext>
+            </a:extLst>
+          </p:cNvPr>
+          <p:cNvSpPr>
+            <a:spLocks noGrp="1"/>
+          </p:cNvSpPr>
+          <p:nvPr>
+            <p:ph type="title"/>
+          </p:nvPr>
+        </p:nvSpPr>
+        <p:spPr/>
+        <p:txBody>
+          <a:bodyPr/>
+          <a:lstStyle/>
+          <a:p>
+            <a:r>
+              <a:rPr lang="en-US" dirty="0"/>
+              <a:t>6.8 Summary</a:t>
+            </a:r>
+          </a:p>
+        </p:txBody>
+      </p:sp>
+      <p:sp>
+        <p:nvSpPr>
+          <p:cNvPr id="3" name="Content Placeholder 2">
+            <a:extLst>
+              <a:ext uri="{FF2B5EF4-FFF2-40B4-BE49-F238E27FC236}">
+                <a16:creationId xmlns:a16="http://schemas.microsoft.com/office/drawing/2014/main" id="{B4497A15-27CB-DE40-ABDE-722A0FB0E922}"/>
+              </a:ext>
+            </a:extLst>
+          </p:cNvPr>
+          <p:cNvSpPr>
+            <a:spLocks noGrp="1"/>
+          </p:cNvSpPr>
+          <p:nvPr>
+            <p:ph idx="1"/>
+          </p:nvPr>
+        </p:nvSpPr>
+        <p:spPr/>
+        <p:txBody>
+          <a:bodyPr/>
+          <a:lstStyle/>
+          <a:p>
+            <a:r>
+              <a:rPr lang="en-US" dirty="0"/>
+              <a:t>The many different 2D-symmetric fusion devices are quickly gone over again. </a:t>
+            </a:r>
+          </a:p>
+        </p:txBody>
+      </p:sp>
+    </p:spTree>
+    <p:extLst>
+      <p:ext uri="{BB962C8B-B14F-4D97-AF65-F5344CB8AC3E}">
+        <p14:creationId xmlns:p14="http://schemas.microsoft.com/office/powerpoint/2010/main" val="3940995596"/>
+      </p:ext>
+    </p:extLst>
+  </p:cSld>
+  <p:clrMapOvr>
+    <a:masterClrMapping/>
+  </p:clrMapOvr>
+</p:sld>
+</file>
+
 <file path=ppt/slides/slide2.xml><?xml version="1.0" encoding="utf-8"?>
 <p:sld xmlns:a="http://schemas.openxmlformats.org/drawingml/2006/main" xmlns:r="http://schemas.openxmlformats.org/officeDocument/2006/relationships" xmlns:p="http://schemas.openxmlformats.org/presentationml/2006/main">
   <p:cSld>
@@ -3580,7 +4895,7 @@
             <a:pPr lvl="1"/>
             <a:r>
               <a:rPr lang="en-US" dirty="0"/>
-              <a:t>Tokamak</a:t>
+              <a:t>Tokamak/ spherical tokamak</a:t>
             </a:r>
           </a:p>
           <a:p>
@@ -3684,8 +4999,8 @@
           </a:p>
         </p:txBody>
       </p:sp>
-      <mc:AlternateContent xmlns:mc="http://schemas.openxmlformats.org/markup-compatibility/2006">
-        <mc:Choice xmlns:a14="http://schemas.microsoft.com/office/drawing/2010/main" Requires="a14">
+      <mc:AlternateContent xmlns:mc="http://schemas.openxmlformats.org/markup-compatibility/2006" xmlns:a14="http://schemas.microsoft.com/office/drawing/2010/main">
+        <mc:Choice Requires="a14">
           <p:sp>
             <p:nvSpPr>
               <p:cNvPr id="3" name="Content Placeholder 2">
@@ -3814,7 +5129,7 @@
             </p:txBody>
           </p:sp>
         </mc:Choice>
-        <mc:Fallback>
+        <mc:Fallback xmlns="">
           <p:sp>
             <p:nvSpPr>
               <p:cNvPr id="3" name="Content Placeholder 2">
@@ -3912,8 +5227,8 @@
           </a:p>
         </p:txBody>
       </p:sp>
-      <mc:AlternateContent xmlns:mc="http://schemas.openxmlformats.org/markup-compatibility/2006">
-        <mc:Choice xmlns:a14="http://schemas.microsoft.com/office/drawing/2010/main" Requires="a14">
+      <mc:AlternateContent xmlns:mc="http://schemas.openxmlformats.org/markup-compatibility/2006" xmlns:a14="http://schemas.microsoft.com/office/drawing/2010/main">
+        <mc:Choice Requires="a14">
           <p:sp>
             <p:nvSpPr>
               <p:cNvPr id="3" name="Content Placeholder 2">
@@ -4004,7 +5319,7 @@
             </p:txBody>
           </p:sp>
         </mc:Choice>
-        <mc:Fallback>
+        <mc:Fallback xmlns="">
           <p:sp>
             <p:nvSpPr>
               <p:cNvPr id="3" name="Content Placeholder 2">
@@ -4074,8 +5389,8 @@
           <a:chExt cx="0" cy="0"/>
         </a:xfrm>
       </p:grpSpPr>
-      <mc:AlternateContent xmlns:mc="http://schemas.openxmlformats.org/markup-compatibility/2006">
-        <mc:Choice xmlns:a14="http://schemas.microsoft.com/office/drawing/2010/main" Requires="a14">
+      <mc:AlternateContent xmlns:mc="http://schemas.openxmlformats.org/markup-compatibility/2006" xmlns:a14="http://schemas.microsoft.com/office/drawing/2010/main">
+        <mc:Choice Requires="a14">
           <p:sp>
             <p:nvSpPr>
               <p:cNvPr id="2" name="Title 1">
@@ -4143,7 +5458,7 @@
             </p:txBody>
           </p:sp>
         </mc:Choice>
-        <mc:Fallback>
+        <mc:Fallback xmlns="">
           <p:sp>
             <p:nvSpPr>
               <p:cNvPr id="2" name="Title 1">
@@ -4183,8 +5498,8 @@
           </p:sp>
         </mc:Fallback>
       </mc:AlternateContent>
-      <mc:AlternateContent xmlns:mc="http://schemas.openxmlformats.org/markup-compatibility/2006">
-        <mc:Choice xmlns:a14="http://schemas.microsoft.com/office/drawing/2010/main" Requires="a14">
+      <mc:AlternateContent xmlns:mc="http://schemas.openxmlformats.org/markup-compatibility/2006" xmlns:a14="http://schemas.microsoft.com/office/drawing/2010/main">
+        <mc:Choice Requires="a14">
           <p:sp>
             <p:nvSpPr>
               <p:cNvPr id="3" name="Content Placeholder 2">
@@ -4461,7 +5776,7 @@
             </p:txBody>
           </p:sp>
         </mc:Choice>
-        <mc:Fallback>
+        <mc:Fallback xmlns="">
           <p:sp>
             <p:nvSpPr>
               <p:cNvPr id="3" name="Content Placeholder 2">
@@ -4531,8 +5846,8 @@
           <a:chExt cx="0" cy="0"/>
         </a:xfrm>
       </p:grpSpPr>
-      <mc:AlternateContent xmlns:mc="http://schemas.openxmlformats.org/markup-compatibility/2006">
-        <mc:Choice xmlns:a14="http://schemas.microsoft.com/office/drawing/2010/main" Requires="a14">
+      <mc:AlternateContent xmlns:mc="http://schemas.openxmlformats.org/markup-compatibility/2006" xmlns:a14="http://schemas.microsoft.com/office/drawing/2010/main">
+        <mc:Choice Requires="a14">
           <p:sp>
             <p:nvSpPr>
               <p:cNvPr id="2" name="Title 1">
@@ -4563,13 +5878,13 @@
                 <a14:m>
                   <m:oMath xmlns:m="http://schemas.openxmlformats.org/officeDocument/2006/math">
                     <m:r>
-                      <a:rPr lang="en-US" i="1">
+                      <a:rPr lang="en-US" i="1" smtClean="0">
                         <a:latin typeface="Cambria Math" panose="02040503050406030204" pitchFamily="18" charset="0"/>
                       </a:rPr>
                       <m:t>𝜖</m:t>
                     </m:r>
                     <m:r>
-                      <a:rPr lang="en-US" i="1">
+                      <a:rPr lang="en-US" i="1" smtClean="0">
                         <a:latin typeface="Cambria Math" panose="02040503050406030204" pitchFamily="18" charset="0"/>
                       </a:rPr>
                       <m:t>≪1</m:t>
@@ -4637,7 +5952,7 @@
             </p:txBody>
           </p:sp>
         </mc:Choice>
-        <mc:Fallback>
+        <mc:Fallback xmlns="">
           <p:sp>
             <p:nvSpPr>
               <p:cNvPr id="2" name="Title 1">
@@ -4721,6 +6036,243 @@
     <p:extLst>
       <p:ext uri="{BB962C8B-B14F-4D97-AF65-F5344CB8AC3E}">
         <p14:creationId xmlns:p14="http://schemas.microsoft.com/office/powerpoint/2010/main" val="444056403"/>
+      </p:ext>
+    </p:extLst>
+  </p:cSld>
+  <p:clrMapOvr>
+    <a:masterClrMapping/>
+  </p:clrMapOvr>
+</p:sld>
+</file>
+
+<file path=ppt/slides/slide8.xml><?xml version="1.0" encoding="utf-8"?>
+<p:sld xmlns:a="http://schemas.openxmlformats.org/drawingml/2006/main" xmlns:r="http://schemas.openxmlformats.org/officeDocument/2006/relationships" xmlns:p="http://schemas.openxmlformats.org/presentationml/2006/main">
+  <p:cSld>
+    <p:spTree>
+      <p:nvGrpSpPr>
+        <p:cNvPr id="1" name=""/>
+        <p:cNvGrpSpPr/>
+        <p:nvPr/>
+      </p:nvGrpSpPr>
+      <p:grpSpPr>
+        <a:xfrm>
+          <a:off x="0" y="0"/>
+          <a:ext cx="0" cy="0"/>
+          <a:chOff x="0" y="0"/>
+          <a:chExt cx="0" cy="0"/>
+        </a:xfrm>
+      </p:grpSpPr>
+      <p:sp>
+        <p:nvSpPr>
+          <p:cNvPr id="2" name="Title 1">
+            <a:extLst>
+              <a:ext uri="{FF2B5EF4-FFF2-40B4-BE49-F238E27FC236}">
+                <a16:creationId xmlns:a16="http://schemas.microsoft.com/office/drawing/2014/main" id="{088F2381-6FCE-534B-9EBB-1C1648C336C3}"/>
+              </a:ext>
+            </a:extLst>
+          </p:cNvPr>
+          <p:cNvSpPr>
+            <a:spLocks noGrp="1"/>
+          </p:cNvSpPr>
+          <p:nvPr>
+            <p:ph type="title"/>
+          </p:nvPr>
+        </p:nvSpPr>
+        <p:spPr/>
+        <p:txBody>
+          <a:bodyPr/>
+          <a:lstStyle/>
+          <a:p>
+            <a:r>
+              <a:rPr lang="en-US" dirty="0"/>
+              <a:t>6.6 Exact Solutions to the Grad-</a:t>
+            </a:r>
+            <a:r>
+              <a:rPr lang="en-US" dirty="0" err="1"/>
+              <a:t>Shafranov</a:t>
+            </a:r>
+            <a:r>
+              <a:rPr lang="en-US" dirty="0"/>
+              <a:t> Equation </a:t>
+            </a:r>
+          </a:p>
+        </p:txBody>
+      </p:sp>
+      <p:sp>
+        <p:nvSpPr>
+          <p:cNvPr id="3" name="Content Placeholder 2">
+            <a:extLst>
+              <a:ext uri="{FF2B5EF4-FFF2-40B4-BE49-F238E27FC236}">
+                <a16:creationId xmlns:a16="http://schemas.microsoft.com/office/drawing/2014/main" id="{E1877692-03F0-834F-B743-6BE364DD78FD}"/>
+              </a:ext>
+            </a:extLst>
+          </p:cNvPr>
+          <p:cNvSpPr>
+            <a:spLocks noGrp="1"/>
+          </p:cNvSpPr>
+          <p:nvPr>
+            <p:ph idx="1"/>
+          </p:nvPr>
+        </p:nvSpPr>
+        <p:spPr/>
+        <p:txBody>
+          <a:bodyPr/>
+          <a:lstStyle/>
+          <a:p>
+            <a:r>
+              <a:rPr lang="en-US" dirty="0"/>
+              <a:t>Real tokamaks, and especially spherical tokamaks, do not satisfy the Taylor expansion criteria</a:t>
+            </a:r>
+          </a:p>
+          <a:p>
+            <a:r>
+              <a:rPr lang="en-US" dirty="0"/>
+              <a:t>Numerical solutions exist to compare to experiments, but we lose the scaling properties</a:t>
+            </a:r>
+          </a:p>
+          <a:p>
+            <a:r>
+              <a:rPr lang="en-US" dirty="0"/>
+              <a:t>Therefore, we want to solve exactly, analytically</a:t>
+            </a:r>
+          </a:p>
+          <a:p>
+            <a:pPr marL="0" indent="0">
+              <a:buNone/>
+            </a:pPr>
+            <a:endParaRPr lang="en-US" dirty="0"/>
+          </a:p>
+        </p:txBody>
+      </p:sp>
+    </p:spTree>
+    <p:extLst>
+      <p:ext uri="{BB962C8B-B14F-4D97-AF65-F5344CB8AC3E}">
+        <p14:creationId xmlns:p14="http://schemas.microsoft.com/office/powerpoint/2010/main" val="4048780420"/>
+      </p:ext>
+    </p:extLst>
+  </p:cSld>
+  <p:clrMapOvr>
+    <a:masterClrMapping/>
+  </p:clrMapOvr>
+</p:sld>
+</file>
+
+<file path=ppt/slides/slide9.xml><?xml version="1.0" encoding="utf-8"?>
+<p:sld xmlns:a="http://schemas.openxmlformats.org/drawingml/2006/main" xmlns:r="http://schemas.openxmlformats.org/officeDocument/2006/relationships" xmlns:p="http://schemas.openxmlformats.org/presentationml/2006/main">
+  <p:cSld>
+    <p:spTree>
+      <p:nvGrpSpPr>
+        <p:cNvPr id="1" name=""/>
+        <p:cNvGrpSpPr/>
+        <p:nvPr/>
+      </p:nvGrpSpPr>
+      <p:grpSpPr>
+        <a:xfrm>
+          <a:off x="0" y="0"/>
+          <a:ext cx="0" cy="0"/>
+          <a:chOff x="0" y="0"/>
+          <a:chExt cx="0" cy="0"/>
+        </a:xfrm>
+      </p:grpSpPr>
+      <p:sp>
+        <p:nvSpPr>
+          <p:cNvPr id="2" name="Title 1">
+            <a:extLst>
+              <a:ext uri="{FF2B5EF4-FFF2-40B4-BE49-F238E27FC236}">
+                <a16:creationId xmlns:a16="http://schemas.microsoft.com/office/drawing/2014/main" id="{A4F4763A-E0C4-4C49-A46F-0A3A9FCEE9F0}"/>
+              </a:ext>
+            </a:extLst>
+          </p:cNvPr>
+          <p:cNvSpPr>
+            <a:spLocks noGrp="1"/>
+          </p:cNvSpPr>
+          <p:nvPr>
+            <p:ph type="title"/>
+          </p:nvPr>
+        </p:nvSpPr>
+        <p:spPr/>
+        <p:txBody>
+          <a:bodyPr/>
+          <a:lstStyle/>
+          <a:p>
+            <a:r>
+              <a:rPr lang="en-US" dirty="0"/>
+              <a:t>6.6.1 Mathematical Formulation</a:t>
+            </a:r>
+          </a:p>
+        </p:txBody>
+      </p:sp>
+      <p:sp>
+        <p:nvSpPr>
+          <p:cNvPr id="3" name="Content Placeholder 2">
+            <a:extLst>
+              <a:ext uri="{FF2B5EF4-FFF2-40B4-BE49-F238E27FC236}">
+                <a16:creationId xmlns:a16="http://schemas.microsoft.com/office/drawing/2014/main" id="{4CD4E018-BB47-D444-A3C2-24875D2FFA03}"/>
+              </a:ext>
+            </a:extLst>
+          </p:cNvPr>
+          <p:cNvSpPr>
+            <a:spLocks noGrp="1"/>
+          </p:cNvSpPr>
+          <p:nvPr>
+            <p:ph idx="1"/>
+          </p:nvPr>
+        </p:nvSpPr>
+        <p:spPr/>
+        <p:txBody>
+          <a:bodyPr/>
+          <a:lstStyle/>
+          <a:p>
+            <a:r>
+              <a:rPr lang="en-US" dirty="0"/>
+              <a:t>We use constant-first-derivative functions for our free functions (</a:t>
+            </a:r>
+            <a:r>
+              <a:rPr lang="en-US" dirty="0" err="1"/>
+              <a:t>Solov’ev</a:t>
+            </a:r>
+            <a:r>
+              <a:rPr lang="en-US" dirty="0"/>
+              <a:t> profiles)</a:t>
+            </a:r>
+          </a:p>
+          <a:p>
+            <a:r>
+              <a:rPr lang="en-US" dirty="0"/>
+              <a:t>The steps are roughly summarized as</a:t>
+            </a:r>
+          </a:p>
+          <a:p>
+            <a:pPr lvl="1"/>
+            <a:r>
+              <a:rPr lang="en-US" dirty="0"/>
+              <a:t>Choose a good set of basis function</a:t>
+            </a:r>
+          </a:p>
+          <a:p>
+            <a:pPr lvl="1"/>
+            <a:r>
+              <a:rPr lang="en-US" dirty="0"/>
+              <a:t>Pick the right number of terms to constitute a finite sum</a:t>
+            </a:r>
+          </a:p>
+          <a:p>
+            <a:pPr lvl="1"/>
+            <a:r>
+              <a:rPr lang="en-US" dirty="0"/>
+              <a:t>Pick the right set of matching constraints</a:t>
+            </a:r>
+          </a:p>
+          <a:p>
+            <a:pPr lvl="1"/>
+            <a:endParaRPr lang="en-US" dirty="0"/>
+          </a:p>
+        </p:txBody>
+      </p:sp>
+    </p:spTree>
+    <p:extLst>
+      <p:ext uri="{BB962C8B-B14F-4D97-AF65-F5344CB8AC3E}">
+        <p14:creationId xmlns:p14="http://schemas.microsoft.com/office/powerpoint/2010/main" val="920466278"/>
       </p:ext>
     </p:extLst>
   </p:cSld>

</xml_diff>